<commit_message>
DBU finished: corrected database, moved old
</commit_message>
<xml_diff>
--- a/database_unification/unificazione_dataset.pptx
+++ b/database_unification/unificazione_dataset.pptx
@@ -215,7 +215,7 @@
           <a:p>
             <a:fld id="{7DBAB273-B280-4D84-BF2A-7D4F73059AF6}" type="datetimeFigureOut">
               <a:rPr lang="it-IT" smtClean="0"/>
-              <a:t>09/11/2022</a:t>
+              <a:t>11/11/2022</a:t>
             </a:fld>
             <a:endParaRPr lang="it-IT"/>
           </a:p>
@@ -629,7 +629,7 @@
           <a:p>
             <a:fld id="{B8040D3E-5CB5-47DA-B545-844AD46B4732}" type="datetimeFigureOut">
               <a:rPr lang="it-IT" smtClean="0"/>
-              <a:t>09/11/2022</a:t>
+              <a:t>11/11/2022</a:t>
             </a:fld>
             <a:endParaRPr lang="it-IT"/>
           </a:p>
@@ -827,7 +827,7 @@
           <a:p>
             <a:fld id="{B8040D3E-5CB5-47DA-B545-844AD46B4732}" type="datetimeFigureOut">
               <a:rPr lang="it-IT" smtClean="0"/>
-              <a:t>09/11/2022</a:t>
+              <a:t>11/11/2022</a:t>
             </a:fld>
             <a:endParaRPr lang="it-IT"/>
           </a:p>
@@ -1035,7 +1035,7 @@
           <a:p>
             <a:fld id="{B8040D3E-5CB5-47DA-B545-844AD46B4732}" type="datetimeFigureOut">
               <a:rPr lang="it-IT" smtClean="0"/>
-              <a:t>09/11/2022</a:t>
+              <a:t>11/11/2022</a:t>
             </a:fld>
             <a:endParaRPr lang="it-IT"/>
           </a:p>
@@ -1233,7 +1233,7 @@
           <a:p>
             <a:fld id="{B8040D3E-5CB5-47DA-B545-844AD46B4732}" type="datetimeFigureOut">
               <a:rPr lang="it-IT" smtClean="0"/>
-              <a:t>09/11/2022</a:t>
+              <a:t>11/11/2022</a:t>
             </a:fld>
             <a:endParaRPr lang="it-IT"/>
           </a:p>
@@ -1508,7 +1508,7 @@
           <a:p>
             <a:fld id="{B8040D3E-5CB5-47DA-B545-844AD46B4732}" type="datetimeFigureOut">
               <a:rPr lang="it-IT" smtClean="0"/>
-              <a:t>09/11/2022</a:t>
+              <a:t>11/11/2022</a:t>
             </a:fld>
             <a:endParaRPr lang="it-IT"/>
           </a:p>
@@ -1773,7 +1773,7 @@
           <a:p>
             <a:fld id="{B8040D3E-5CB5-47DA-B545-844AD46B4732}" type="datetimeFigureOut">
               <a:rPr lang="it-IT" smtClean="0"/>
-              <a:t>09/11/2022</a:t>
+              <a:t>11/11/2022</a:t>
             </a:fld>
             <a:endParaRPr lang="it-IT"/>
           </a:p>
@@ -2185,7 +2185,7 @@
           <a:p>
             <a:fld id="{B8040D3E-5CB5-47DA-B545-844AD46B4732}" type="datetimeFigureOut">
               <a:rPr lang="it-IT" smtClean="0"/>
-              <a:t>09/11/2022</a:t>
+              <a:t>11/11/2022</a:t>
             </a:fld>
             <a:endParaRPr lang="it-IT"/>
           </a:p>
@@ -2326,7 +2326,7 @@
           <a:p>
             <a:fld id="{B8040D3E-5CB5-47DA-B545-844AD46B4732}" type="datetimeFigureOut">
               <a:rPr lang="it-IT" smtClean="0"/>
-              <a:t>09/11/2022</a:t>
+              <a:t>11/11/2022</a:t>
             </a:fld>
             <a:endParaRPr lang="it-IT"/>
           </a:p>
@@ -2439,7 +2439,7 @@
           <a:p>
             <a:fld id="{B8040D3E-5CB5-47DA-B545-844AD46B4732}" type="datetimeFigureOut">
               <a:rPr lang="it-IT" smtClean="0"/>
-              <a:t>09/11/2022</a:t>
+              <a:t>11/11/2022</a:t>
             </a:fld>
             <a:endParaRPr lang="it-IT"/>
           </a:p>
@@ -2750,7 +2750,7 @@
           <a:p>
             <a:fld id="{B8040D3E-5CB5-47DA-B545-844AD46B4732}" type="datetimeFigureOut">
               <a:rPr lang="it-IT" smtClean="0"/>
-              <a:t>09/11/2022</a:t>
+              <a:t>11/11/2022</a:t>
             </a:fld>
             <a:endParaRPr lang="it-IT"/>
           </a:p>
@@ -3038,7 +3038,7 @@
           <a:p>
             <a:fld id="{B8040D3E-5CB5-47DA-B545-844AD46B4732}" type="datetimeFigureOut">
               <a:rPr lang="it-IT" smtClean="0"/>
-              <a:t>09/11/2022</a:t>
+              <a:t>11/11/2022</a:t>
             </a:fld>
             <a:endParaRPr lang="it-IT"/>
           </a:p>
@@ -3279,7 +3279,7 @@
           <a:p>
             <a:fld id="{B8040D3E-5CB5-47DA-B545-844AD46B4732}" type="datetimeFigureOut">
               <a:rPr lang="it-IT" smtClean="0"/>
-              <a:t>09/11/2022</a:t>
+              <a:t>11/11/2022</a:t>
             </a:fld>
             <a:endParaRPr lang="it-IT"/>
           </a:p>

</xml_diff>